<commit_message>
fixed errors caused by NaN values
</commit_message>
<xml_diff>
--- a/일싹이 소개.pptx
+++ b/일싹이 소개.pptx
@@ -311,7 +311,7 @@
           <a:p>
             <a:fld id="{81B8F32D-D8B6-4B9E-9CBF-DCAC30B7B93D}" type="datetimeFigureOut">
               <a:rPr lang="en-US" smtClean="0"/>
-              <a:t>5/2/2024</a:t>
+              <a:t>5/3/2024</a:t>
             </a:fld>
             <a:endParaRPr lang="en-US"/>
           </a:p>
@@ -627,7 +627,7 @@
           <a:p>
             <a:fld id="{81B8F32D-D8B6-4B9E-9CBF-DCAC30B7B93D}" type="datetimeFigureOut">
               <a:rPr lang="en-US" smtClean="0"/>
-              <a:t>5/2/2024</a:t>
+              <a:t>5/3/2024</a:t>
             </a:fld>
             <a:endParaRPr lang="en-US"/>
           </a:p>
@@ -932,7 +932,7 @@
           <a:p>
             <a:fld id="{81B8F32D-D8B6-4B9E-9CBF-DCAC30B7B93D}" type="datetimeFigureOut">
               <a:rPr lang="en-US" smtClean="0"/>
-              <a:t>5/2/2024</a:t>
+              <a:t>5/3/2024</a:t>
             </a:fld>
             <a:endParaRPr lang="en-US"/>
           </a:p>
@@ -1139,7 +1139,7 @@
           <a:p>
             <a:fld id="{81B8F32D-D8B6-4B9E-9CBF-DCAC30B7B93D}" type="datetimeFigureOut">
               <a:rPr lang="en-US" smtClean="0"/>
-              <a:t>5/2/2024</a:t>
+              <a:t>5/3/2024</a:t>
             </a:fld>
             <a:endParaRPr lang="en-US"/>
           </a:p>
@@ -1487,7 +1487,7 @@
           <a:p>
             <a:fld id="{81B8F32D-D8B6-4B9E-9CBF-DCAC30B7B93D}" type="datetimeFigureOut">
               <a:rPr lang="en-US" smtClean="0"/>
-              <a:t>5/2/2024</a:t>
+              <a:t>5/3/2024</a:t>
             </a:fld>
             <a:endParaRPr lang="en-US"/>
           </a:p>
@@ -1958,7 +1958,7 @@
           <a:p>
             <a:fld id="{81B8F32D-D8B6-4B9E-9CBF-DCAC30B7B93D}" type="datetimeFigureOut">
               <a:rPr lang="en-US" smtClean="0"/>
-              <a:t>5/2/2024</a:t>
+              <a:t>5/3/2024</a:t>
             </a:fld>
             <a:endParaRPr lang="en-US"/>
           </a:p>
@@ -2493,7 +2493,7 @@
           <a:p>
             <a:fld id="{81B8F32D-D8B6-4B9E-9CBF-DCAC30B7B93D}" type="datetimeFigureOut">
               <a:rPr lang="en-US" smtClean="0"/>
-              <a:t>5/2/2024</a:t>
+              <a:t>5/3/2024</a:t>
             </a:fld>
             <a:endParaRPr lang="en-US"/>
           </a:p>
@@ -2710,7 +2710,7 @@
           <a:p>
             <a:fld id="{81B8F32D-D8B6-4B9E-9CBF-DCAC30B7B93D}" type="datetimeFigureOut">
               <a:rPr lang="en-US" smtClean="0"/>
-              <a:t>5/2/2024</a:t>
+              <a:t>5/3/2024</a:t>
             </a:fld>
             <a:endParaRPr lang="en-US"/>
           </a:p>
@@ -2915,7 +2915,7 @@
           <a:p>
             <a:fld id="{81B8F32D-D8B6-4B9E-9CBF-DCAC30B7B93D}" type="datetimeFigureOut">
               <a:rPr lang="en-US" smtClean="0"/>
-              <a:t>5/2/2024</a:t>
+              <a:t>5/3/2024</a:t>
             </a:fld>
             <a:endParaRPr lang="en-US"/>
           </a:p>
@@ -3245,7 +3245,7 @@
           <a:p>
             <a:fld id="{81B8F32D-D8B6-4B9E-9CBF-DCAC30B7B93D}" type="datetimeFigureOut">
               <a:rPr lang="en-US" smtClean="0"/>
-              <a:t>5/2/2024</a:t>
+              <a:t>5/3/2024</a:t>
             </a:fld>
             <a:endParaRPr lang="en-US"/>
           </a:p>
@@ -3555,7 +3555,7 @@
           <a:p>
             <a:fld id="{81B8F32D-D8B6-4B9E-9CBF-DCAC30B7B93D}" type="datetimeFigureOut">
               <a:rPr lang="en-US" smtClean="0"/>
-              <a:t>5/2/2024</a:t>
+              <a:t>5/3/2024</a:t>
             </a:fld>
             <a:endParaRPr lang="en-US"/>
           </a:p>
@@ -3792,7 +3792,7 @@
             <a:fld id="{81B8F32D-D8B6-4B9E-9CBF-DCAC30B7B93D}" type="datetimeFigureOut">
               <a:rPr lang="en-US" smtClean="0"/>
               <a:pPr/>
-              <a:t>5/2/2024</a:t>
+              <a:t>5/3/2024</a:t>
             </a:fld>
             <a:endParaRPr lang="en-US" dirty="0"/>
           </a:p>
@@ -24196,6 +24196,58 @@
               <a:t>출첵 </a:t>
             </a:r>
             <a:r>
+              <a:rPr lang="en-US" altLang="ko-KR" sz="2000" dirty="0">
+                <a:solidFill>
+                  <a:srgbClr val="19633E">
+                    <a:alpha val="50000"/>
+                  </a:srgbClr>
+                </a:solidFill>
+                <a:latin typeface="휴먼둥근헤드라인" panose="02030504000101010101" pitchFamily="18" charset="-127"/>
+                <a:ea typeface="휴먼둥근헤드라인" panose="02030504000101010101" pitchFamily="18" charset="-127"/>
+                <a:cs typeface="Malgun Gothic Semilight" panose="020B0502040204020203" pitchFamily="50" charset="-127"/>
+              </a:rPr>
+              <a:t>or</a:t>
+            </a:r>
+            <a:r>
+              <a:rPr lang="ko-KR" altLang="en-US" sz="2000" dirty="0">
+                <a:solidFill>
+                  <a:srgbClr val="19633E">
+                    <a:alpha val="50000"/>
+                  </a:srgbClr>
+                </a:solidFill>
+                <a:latin typeface="휴먼둥근헤드라인" panose="02030504000101010101" pitchFamily="18" charset="-127"/>
+                <a:ea typeface="휴먼둥근헤드라인" panose="02030504000101010101" pitchFamily="18" charset="-127"/>
+                <a:cs typeface="Malgun Gothic Semilight" panose="020B0502040204020203" pitchFamily="50" charset="-127"/>
+              </a:rPr>
+              <a:t> </a:t>
+            </a:r>
+            <a:r>
+              <a:rPr lang="en-US" altLang="ko-KR" sz="2000" dirty="0">
+                <a:solidFill>
+                  <a:srgbClr val="19633E">
+                    <a:alpha val="50000"/>
+                  </a:srgbClr>
+                </a:solidFill>
+                <a:latin typeface="휴먼둥근헤드라인" panose="02030504000101010101" pitchFamily="18" charset="-127"/>
+                <a:ea typeface="휴먼둥근헤드라인" panose="02030504000101010101" pitchFamily="18" charset="-127"/>
+                <a:cs typeface="Malgun Gothic Semilight" panose="020B0502040204020203" pitchFamily="50" charset="-127"/>
+              </a:rPr>
+              <a:t>!</a:t>
+            </a:r>
+            <a:r>
+              <a:rPr lang="ko-KR" altLang="en-US" sz="2000" dirty="0">
+                <a:solidFill>
+                  <a:srgbClr val="19633E">
+                    <a:alpha val="50000"/>
+                  </a:srgbClr>
+                </a:solidFill>
+                <a:latin typeface="휴먼둥근헤드라인" panose="02030504000101010101" pitchFamily="18" charset="-127"/>
+                <a:ea typeface="휴먼둥근헤드라인" panose="02030504000101010101" pitchFamily="18" charset="-127"/>
+                <a:cs typeface="Malgun Gothic Semilight" panose="020B0502040204020203" pitchFamily="50" charset="-127"/>
+              </a:rPr>
+              <a:t>출석 </a:t>
+            </a:r>
+            <a:r>
               <a:rPr lang="ko-KR" altLang="en-US" sz="2000" dirty="0">
                 <a:solidFill>
                   <a:srgbClr val="872135"/>
@@ -24277,7 +24329,7 @@
               <a:t>[</a:t>
             </a:r>
             <a:r>
-              <a:rPr lang="ko-KR" altLang="en-US" sz="2000" dirty="0" err="1">
+              <a:rPr lang="ko-KR" altLang="en-US" sz="2000" dirty="0">
                 <a:solidFill>
                   <a:srgbClr val="19633E">
                     <a:alpha val="50000"/>
@@ -24287,7 +24339,7 @@
                 <a:ea typeface="휴먼둥근헤드라인" panose="02030504000101010101" pitchFamily="18" charset="-127"/>
                 <a:cs typeface="Malgun Gothic Semilight" panose="020B0502040204020203" pitchFamily="50" charset="-127"/>
               </a:rPr>
-              <a:t>선수명</a:t>
+              <a:t>선수번호</a:t>
             </a:r>
             <a:r>
               <a:rPr lang="en-US" altLang="ko-KR" sz="2000" dirty="0">
@@ -24418,6 +24470,58 @@
             <a:r>
               <a:rPr lang="en-US" altLang="ko-KR" sz="2000" dirty="0">
                 <a:solidFill>
+                  <a:srgbClr val="19633E">
+                    <a:alpha val="50000"/>
+                  </a:srgbClr>
+                </a:solidFill>
+                <a:latin typeface="휴먼둥근헤드라인" panose="02030504000101010101" pitchFamily="18" charset="-127"/>
+                <a:ea typeface="휴먼둥근헤드라인" panose="02030504000101010101" pitchFamily="18" charset="-127"/>
+                <a:cs typeface="Malgun Gothic Semilight" panose="020B0502040204020203" pitchFamily="50" charset="-127"/>
+              </a:rPr>
+              <a:t>[</a:t>
+            </a:r>
+            <a:r>
+              <a:rPr lang="ko-KR" altLang="en-US" sz="2000" dirty="0">
+                <a:solidFill>
+                  <a:srgbClr val="19633E">
+                    <a:alpha val="50000"/>
+                  </a:srgbClr>
+                </a:solidFill>
+                <a:latin typeface="휴먼둥근헤드라인" panose="02030504000101010101" pitchFamily="18" charset="-127"/>
+                <a:ea typeface="휴먼둥근헤드라인" panose="02030504000101010101" pitchFamily="18" charset="-127"/>
+                <a:cs typeface="Malgun Gothic Semilight" panose="020B0502040204020203" pitchFamily="50" charset="-127"/>
+              </a:rPr>
+              <a:t>선수이름</a:t>
+            </a:r>
+            <a:r>
+              <a:rPr lang="en-US" altLang="ko-KR" sz="2000" dirty="0">
+                <a:solidFill>
+                  <a:srgbClr val="19633E">
+                    <a:alpha val="50000"/>
+                  </a:srgbClr>
+                </a:solidFill>
+                <a:latin typeface="휴먼둥근헤드라인" panose="02030504000101010101" pitchFamily="18" charset="-127"/>
+                <a:ea typeface="휴먼둥근헤드라인" panose="02030504000101010101" pitchFamily="18" charset="-127"/>
+                <a:cs typeface="Malgun Gothic Semilight" panose="020B0502040204020203" pitchFamily="50" charset="-127"/>
+              </a:rPr>
+              <a:t>]</a:t>
+            </a:r>
+            <a:r>
+              <a:rPr lang="ko-KR" altLang="en-US" sz="2000" dirty="0">
+                <a:solidFill>
+                  <a:srgbClr val="19633E">
+                    <a:alpha val="50000"/>
+                  </a:srgbClr>
+                </a:solidFill>
+                <a:latin typeface="휴먼둥근헤드라인" panose="02030504000101010101" pitchFamily="18" charset="-127"/>
+                <a:ea typeface="휴먼둥근헤드라인" panose="02030504000101010101" pitchFamily="18" charset="-127"/>
+                <a:cs typeface="Malgun Gothic Semilight" panose="020B0502040204020203" pitchFamily="50" charset="-127"/>
+              </a:rPr>
+              <a:t> </a:t>
+            </a:r>
+            <a:r>
+              <a:rPr lang="en-US" altLang="ko-KR" sz="2000" dirty="0">
+                <a:solidFill>
                   <a:srgbClr val="872135"/>
                 </a:solidFill>
                 <a:latin typeface="휴먼둥근헤드라인" panose="02030504000101010101" pitchFamily="18" charset="-127"/>
@@ -24492,45 +24596,6 @@
               <a:t>포인트 </a:t>
             </a:r>
             <a:r>
-              <a:rPr lang="en-US" altLang="ko-KR" sz="2000" dirty="0">
-                <a:solidFill>
-                  <a:srgbClr val="19633E">
-                    <a:alpha val="50000"/>
-                  </a:srgbClr>
-                </a:solidFill>
-                <a:latin typeface="휴먼둥근헤드라인" panose="02030504000101010101" pitchFamily="18" charset="-127"/>
-                <a:ea typeface="휴먼둥근헤드라인" panose="02030504000101010101" pitchFamily="18" charset="-127"/>
-                <a:cs typeface="Malgun Gothic Semilight" panose="020B0502040204020203" pitchFamily="50" charset="-127"/>
-              </a:rPr>
-              <a:t>[*</a:t>
-            </a:r>
-            <a:r>
-              <a:rPr lang="ko-KR" altLang="en-US" sz="2000" dirty="0">
-                <a:solidFill>
-                  <a:srgbClr val="19633E">
-                    <a:alpha val="50000"/>
-                  </a:srgbClr>
-                </a:solidFill>
-                <a:latin typeface="휴먼둥근헤드라인" panose="02030504000101010101" pitchFamily="18" charset="-127"/>
-                <a:ea typeface="휴먼둥근헤드라인" panose="02030504000101010101" pitchFamily="18" charset="-127"/>
-                <a:cs typeface="Malgun Gothic Semilight" panose="020B0502040204020203" pitchFamily="50" charset="-127"/>
-              </a:rPr>
-              <a:t>시청자 이름</a:t>
-            </a:r>
-            <a:r>
-              <a:rPr lang="en-US" altLang="ko-KR" sz="2000" dirty="0">
-                <a:solidFill>
-                  <a:srgbClr val="19633E">
-                    <a:alpha val="50000"/>
-                  </a:srgbClr>
-                </a:solidFill>
-                <a:latin typeface="휴먼둥근헤드라인" panose="02030504000101010101" pitchFamily="18" charset="-127"/>
-                <a:ea typeface="휴먼둥근헤드라인" panose="02030504000101010101" pitchFamily="18" charset="-127"/>
-                <a:cs typeface="Malgun Gothic Semilight" panose="020B0502040204020203" pitchFamily="50" charset="-127"/>
-              </a:rPr>
-              <a:t>] </a:t>
-            </a:r>
-            <a:r>
               <a:rPr lang="ko-KR" altLang="en-US" sz="2000" dirty="0">
                 <a:solidFill>
                   <a:srgbClr val="872135"/>
@@ -24585,45 +24650,6 @@
               <a:t>등락 </a:t>
             </a:r>
             <a:r>
-              <a:rPr lang="en-US" altLang="ko-KR" sz="2000" dirty="0">
-                <a:solidFill>
-                  <a:srgbClr val="19633E">
-                    <a:alpha val="50000"/>
-                  </a:srgbClr>
-                </a:solidFill>
-                <a:latin typeface="휴먼둥근헤드라인" panose="02030504000101010101" pitchFamily="18" charset="-127"/>
-                <a:ea typeface="휴먼둥근헤드라인" panose="02030504000101010101" pitchFamily="18" charset="-127"/>
-                <a:cs typeface="Malgun Gothic Semilight" panose="020B0502040204020203" pitchFamily="50" charset="-127"/>
-              </a:rPr>
-              <a:t>[*</a:t>
-            </a:r>
-            <a:r>
-              <a:rPr lang="ko-KR" altLang="en-US" sz="2000" dirty="0">
-                <a:solidFill>
-                  <a:srgbClr val="19633E">
-                    <a:alpha val="50000"/>
-                  </a:srgbClr>
-                </a:solidFill>
-                <a:latin typeface="휴먼둥근헤드라인" panose="02030504000101010101" pitchFamily="18" charset="-127"/>
-                <a:ea typeface="휴먼둥근헤드라인" panose="02030504000101010101" pitchFamily="18" charset="-127"/>
-                <a:cs typeface="Malgun Gothic Semilight" panose="020B0502040204020203" pitchFamily="50" charset="-127"/>
-              </a:rPr>
-              <a:t>시청자 이름</a:t>
-            </a:r>
-            <a:r>
-              <a:rPr lang="en-US" altLang="ko-KR" sz="2000" dirty="0">
-                <a:solidFill>
-                  <a:srgbClr val="19633E">
-                    <a:alpha val="50000"/>
-                  </a:srgbClr>
-                </a:solidFill>
-                <a:latin typeface="휴먼둥근헤드라인" panose="02030504000101010101" pitchFamily="18" charset="-127"/>
-                <a:ea typeface="휴먼둥근헤드라인" panose="02030504000101010101" pitchFamily="18" charset="-127"/>
-                <a:cs typeface="Malgun Gothic Semilight" panose="020B0502040204020203" pitchFamily="50" charset="-127"/>
-              </a:rPr>
-              <a:t>] </a:t>
-            </a:r>
-            <a:r>
               <a:rPr lang="ko-KR" altLang="en-US" sz="2000" dirty="0">
                 <a:solidFill>
                   <a:srgbClr val="872135"/>
@@ -24674,45 +24700,6 @@
                 <a:cs typeface="Malgun Gothic Semilight" panose="020B0502040204020203" pitchFamily="50" charset="-127"/>
               </a:rPr>
               <a:t>응원정보 </a:t>
-            </a:r>
-            <a:r>
-              <a:rPr lang="en-US" altLang="ko-KR" sz="2000" dirty="0">
-                <a:solidFill>
-                  <a:srgbClr val="19633E">
-                    <a:alpha val="50000"/>
-                  </a:srgbClr>
-                </a:solidFill>
-                <a:latin typeface="휴먼둥근헤드라인" panose="02030504000101010101" pitchFamily="18" charset="-127"/>
-                <a:ea typeface="휴먼둥근헤드라인" panose="02030504000101010101" pitchFamily="18" charset="-127"/>
-                <a:cs typeface="Malgun Gothic Semilight" panose="020B0502040204020203" pitchFamily="50" charset="-127"/>
-              </a:rPr>
-              <a:t>[*</a:t>
-            </a:r>
-            <a:r>
-              <a:rPr lang="ko-KR" altLang="en-US" sz="2000" dirty="0">
-                <a:solidFill>
-                  <a:srgbClr val="19633E">
-                    <a:alpha val="50000"/>
-                  </a:srgbClr>
-                </a:solidFill>
-                <a:latin typeface="휴먼둥근헤드라인" panose="02030504000101010101" pitchFamily="18" charset="-127"/>
-                <a:ea typeface="휴먼둥근헤드라인" panose="02030504000101010101" pitchFamily="18" charset="-127"/>
-                <a:cs typeface="Malgun Gothic Semilight" panose="020B0502040204020203" pitchFamily="50" charset="-127"/>
-              </a:rPr>
-              <a:t>시청자 이름</a:t>
-            </a:r>
-            <a:r>
-              <a:rPr lang="en-US" altLang="ko-KR" sz="2000" dirty="0">
-                <a:solidFill>
-                  <a:srgbClr val="19633E">
-                    <a:alpha val="50000"/>
-                  </a:srgbClr>
-                </a:solidFill>
-                <a:latin typeface="휴먼둥근헤드라인" panose="02030504000101010101" pitchFamily="18" charset="-127"/>
-                <a:ea typeface="휴먼둥근헤드라인" panose="02030504000101010101" pitchFamily="18" charset="-127"/>
-                <a:cs typeface="Malgun Gothic Semilight" panose="020B0502040204020203" pitchFamily="50" charset="-127"/>
-              </a:rPr>
-              <a:t>] </a:t>
             </a:r>
             <a:r>
               <a:rPr lang="ko-KR" altLang="en-US" sz="2000" dirty="0">

</xml_diff>